<commit_message>
Changement dans le diapo steven
</commit_message>
<xml_diff>
--- a/Diaporama/DIAPO Steven.pptx
+++ b/Diaporama/DIAPO Steven.pptx
@@ -7748,7 +7748,7 @@
           <a:p>
             <a:r>
               <a:rPr lang="fr-FR" dirty="0"/>
-              <a:t>Présentation de la Tracibilité de la livraison </a:t>
+              <a:t>Acquisition des données de la livraison </a:t>
             </a:r>
           </a:p>
         </p:txBody>
@@ -7979,6 +7979,151 @@
           </a:p>
         </p:txBody>
       </p:sp>
+      <p:pic>
+        <p:nvPicPr>
+          <p:cNvPr id="3" name="Image 2">
+            <a:extLst>
+              <a:ext uri="{FF2B5EF4-FFF2-40B4-BE49-F238E27FC236}">
+                <a16:creationId xmlns:a16="http://schemas.microsoft.com/office/drawing/2014/main" id="{F6510815-0135-41B5-A536-DDDE07328BEA}"/>
+              </a:ext>
+            </a:extLst>
+          </p:cNvPr>
+          <p:cNvPicPr>
+            <a:picLocks noChangeAspect="1"/>
+          </p:cNvPicPr>
+          <p:nvPr/>
+        </p:nvPicPr>
+        <p:blipFill>
+          <a:blip r:embed="rId3"/>
+          <a:stretch>
+            <a:fillRect/>
+          </a:stretch>
+        </p:blipFill>
+        <p:spPr>
+          <a:xfrm>
+            <a:off x="390403" y="1772988"/>
+            <a:ext cx="5712035" cy="4486973"/>
+          </a:xfrm>
+          <a:prstGeom prst="rect">
+            <a:avLst/>
+          </a:prstGeom>
+        </p:spPr>
+      </p:pic>
+      <p:pic>
+        <p:nvPicPr>
+          <p:cNvPr id="10" name="Image 9">
+            <a:extLst>
+              <a:ext uri="{FF2B5EF4-FFF2-40B4-BE49-F238E27FC236}">
+                <a16:creationId xmlns:a16="http://schemas.microsoft.com/office/drawing/2014/main" id="{DA6859B6-7F39-45B7-A262-AC61A00B4094}"/>
+              </a:ext>
+            </a:extLst>
+          </p:cNvPr>
+          <p:cNvPicPr>
+            <a:picLocks noChangeAspect="1"/>
+          </p:cNvPicPr>
+          <p:nvPr/>
+        </p:nvPicPr>
+        <p:blipFill rotWithShape="1">
+          <a:blip r:embed="rId4"/>
+          <a:srcRect l="23833" t="69053" r="4378" b="681"/>
+          <a:stretch/>
+        </p:blipFill>
+        <p:spPr>
+          <a:xfrm>
+            <a:off x="6133059" y="2901453"/>
+            <a:ext cx="5627300" cy="1513144"/>
+          </a:xfrm>
+          <a:prstGeom prst="rect">
+            <a:avLst/>
+          </a:prstGeom>
+        </p:spPr>
+      </p:pic>
+      <p:cxnSp>
+        <p:nvCxnSpPr>
+          <p:cNvPr id="11" name="Connecteur droit 10">
+            <a:extLst>
+              <a:ext uri="{FF2B5EF4-FFF2-40B4-BE49-F238E27FC236}">
+                <a16:creationId xmlns:a16="http://schemas.microsoft.com/office/drawing/2014/main" id="{D5C9D399-3DE7-4F8A-BE54-CABA6E6086A9}"/>
+              </a:ext>
+            </a:extLst>
+          </p:cNvPr>
+          <p:cNvCxnSpPr>
+            <a:cxnSpLocks/>
+          </p:cNvCxnSpPr>
+          <p:nvPr/>
+        </p:nvCxnSpPr>
+        <p:spPr>
+          <a:xfrm>
+            <a:off x="6448337" y="3740945"/>
+            <a:ext cx="1623307" cy="0"/>
+          </a:xfrm>
+          <a:prstGeom prst="line">
+            <a:avLst/>
+          </a:prstGeom>
+          <a:ln w="28575">
+            <a:solidFill>
+              <a:srgbClr val="FF0000"/>
+            </a:solidFill>
+          </a:ln>
+        </p:spPr>
+        <p:style>
+          <a:lnRef idx="1">
+            <a:schemeClr val="accent2"/>
+          </a:lnRef>
+          <a:fillRef idx="0">
+            <a:schemeClr val="accent2"/>
+          </a:fillRef>
+          <a:effectRef idx="0">
+            <a:schemeClr val="accent2"/>
+          </a:effectRef>
+          <a:fontRef idx="minor">
+            <a:schemeClr val="tx1"/>
+          </a:fontRef>
+        </p:style>
+      </p:cxnSp>
+      <p:cxnSp>
+        <p:nvCxnSpPr>
+          <p:cNvPr id="13" name="Connecteur droit 12">
+            <a:extLst>
+              <a:ext uri="{FF2B5EF4-FFF2-40B4-BE49-F238E27FC236}">
+                <a16:creationId xmlns:a16="http://schemas.microsoft.com/office/drawing/2014/main" id="{9B830C5F-81FF-4914-9D3C-C1958E4F08C3}"/>
+              </a:ext>
+            </a:extLst>
+          </p:cNvPr>
+          <p:cNvCxnSpPr>
+            <a:cxnSpLocks/>
+          </p:cNvCxnSpPr>
+          <p:nvPr/>
+        </p:nvCxnSpPr>
+        <p:spPr>
+          <a:xfrm>
+            <a:off x="6758004" y="3933892"/>
+            <a:ext cx="1035368" cy="0"/>
+          </a:xfrm>
+          <a:prstGeom prst="line">
+            <a:avLst/>
+          </a:prstGeom>
+          <a:ln w="28575">
+            <a:solidFill>
+              <a:srgbClr val="FF0000"/>
+            </a:solidFill>
+          </a:ln>
+        </p:spPr>
+        <p:style>
+          <a:lnRef idx="1">
+            <a:schemeClr val="accent2"/>
+          </a:lnRef>
+          <a:fillRef idx="0">
+            <a:schemeClr val="accent2"/>
+          </a:fillRef>
+          <a:effectRef idx="0">
+            <a:schemeClr val="accent2"/>
+          </a:effectRef>
+          <a:fontRef idx="minor">
+            <a:schemeClr val="tx1"/>
+          </a:fontRef>
+        </p:style>
+      </p:cxnSp>
     </p:spTree>
     <p:extLst>
       <p:ext uri="{BB962C8B-B14F-4D97-AF65-F5344CB8AC3E}">
@@ -8098,14 +8243,19 @@
             <p:ph type="title"/>
           </p:nvPr>
         </p:nvSpPr>
-        <p:spPr/>
+        <p:spPr>
+          <a:xfrm>
+            <a:off x="1097279" y="286603"/>
+            <a:ext cx="9997441" cy="1450757"/>
+          </a:xfrm>
+        </p:spPr>
         <p:txBody>
           <a:bodyPr/>
           <a:lstStyle/>
           <a:p>
             <a:r>
               <a:rPr lang="fr-FR" dirty="0"/>
-              <a:t>Présentation personnelle</a:t>
+              <a:t>Synchronisation des données de la livraison vers la BDD </a:t>
             </a:r>
           </a:p>
         </p:txBody>
@@ -8336,6 +8486,108 @@
           </a:p>
         </p:txBody>
       </p:sp>
+      <p:pic>
+        <p:nvPicPr>
+          <p:cNvPr id="3" name="Image 2">
+            <a:extLst>
+              <a:ext uri="{FF2B5EF4-FFF2-40B4-BE49-F238E27FC236}">
+                <a16:creationId xmlns:a16="http://schemas.microsoft.com/office/drawing/2014/main" id="{27C23A36-BC5D-49C6-9018-282A756AE4C0}"/>
+              </a:ext>
+            </a:extLst>
+          </p:cNvPr>
+          <p:cNvPicPr>
+            <a:picLocks noChangeAspect="1"/>
+          </p:cNvPicPr>
+          <p:nvPr/>
+        </p:nvPicPr>
+        <p:blipFill>
+          <a:blip r:embed="rId3"/>
+          <a:stretch>
+            <a:fillRect/>
+          </a:stretch>
+        </p:blipFill>
+        <p:spPr>
+          <a:xfrm>
+            <a:off x="562063" y="1674424"/>
+            <a:ext cx="4954892" cy="4644241"/>
+          </a:xfrm>
+          <a:prstGeom prst="rect">
+            <a:avLst/>
+          </a:prstGeom>
+        </p:spPr>
+      </p:pic>
+      <p:pic>
+        <p:nvPicPr>
+          <p:cNvPr id="10" name="Image 9">
+            <a:extLst>
+              <a:ext uri="{FF2B5EF4-FFF2-40B4-BE49-F238E27FC236}">
+                <a16:creationId xmlns:a16="http://schemas.microsoft.com/office/drawing/2014/main" id="{14BF2642-6603-4C49-AB83-440D240AAC7A}"/>
+              </a:ext>
+            </a:extLst>
+          </p:cNvPr>
+          <p:cNvPicPr>
+            <a:picLocks noChangeAspect="1"/>
+          </p:cNvPicPr>
+          <p:nvPr/>
+        </p:nvPicPr>
+        <p:blipFill rotWithShape="1">
+          <a:blip r:embed="rId4"/>
+          <a:srcRect l="23833" t="69053" r="4378" b="681"/>
+          <a:stretch/>
+        </p:blipFill>
+        <p:spPr>
+          <a:xfrm>
+            <a:off x="5626502" y="2916454"/>
+            <a:ext cx="5834725" cy="1568919"/>
+          </a:xfrm>
+          <a:prstGeom prst="rect">
+            <a:avLst/>
+          </a:prstGeom>
+        </p:spPr>
+      </p:pic>
+      <p:cxnSp>
+        <p:nvCxnSpPr>
+          <p:cNvPr id="15" name="Connecteur droit 14">
+            <a:extLst>
+              <a:ext uri="{FF2B5EF4-FFF2-40B4-BE49-F238E27FC236}">
+                <a16:creationId xmlns:a16="http://schemas.microsoft.com/office/drawing/2014/main" id="{04776D8C-1171-452D-A95F-56ADB35F993F}"/>
+              </a:ext>
+            </a:extLst>
+          </p:cNvPr>
+          <p:cNvCxnSpPr>
+            <a:cxnSpLocks/>
+          </p:cNvCxnSpPr>
+          <p:nvPr/>
+        </p:nvCxnSpPr>
+        <p:spPr>
+          <a:xfrm>
+            <a:off x="6095999" y="4177172"/>
+            <a:ext cx="1403034" cy="0"/>
+          </a:xfrm>
+          <a:prstGeom prst="line">
+            <a:avLst/>
+          </a:prstGeom>
+          <a:ln w="28575">
+            <a:solidFill>
+              <a:srgbClr val="FF0000"/>
+            </a:solidFill>
+          </a:ln>
+        </p:spPr>
+        <p:style>
+          <a:lnRef idx="1">
+            <a:schemeClr val="accent2"/>
+          </a:lnRef>
+          <a:fillRef idx="0">
+            <a:schemeClr val="accent2"/>
+          </a:fillRef>
+          <a:effectRef idx="0">
+            <a:schemeClr val="accent2"/>
+          </a:effectRef>
+          <a:fontRef idx="minor">
+            <a:schemeClr val="tx1"/>
+          </a:fontRef>
+        </p:style>
+      </p:cxnSp>
     </p:spTree>
     <p:extLst>
       <p:ext uri="{BB962C8B-B14F-4D97-AF65-F5344CB8AC3E}">
@@ -10590,14 +10842,14 @@
           <p:nvPr>
             <p:extLst>
               <p:ext uri="{D42A27DB-BD31-4B8C-83A1-F6EECF244321}">
-                <p14:modId xmlns:p14="http://schemas.microsoft.com/office/powerpoint/2010/main" val="68253416"/>
+                <p14:modId xmlns:p14="http://schemas.microsoft.com/office/powerpoint/2010/main" val="550274055"/>
               </p:ext>
             </p:extLst>
           </p:nvPr>
         </p:nvGraphicFramePr>
         <p:xfrm>
           <a:off x="886345" y="640081"/>
-          <a:ext cx="6407526" cy="5054161"/>
+          <a:ext cx="6407526" cy="5295234"/>
         </p:xfrm>
         <a:graphic>
           <a:graphicData uri="http://schemas.openxmlformats.org/drawingml/2006/table">
@@ -10760,8 +11012,16 @@
                     <a:lstStyle/>
                     <a:p>
                       <a:r>
-                        <a:rPr lang="fr-FR" sz="1900"/>
-                        <a:t>Produits laitiers frais, œufs, desserts lactés, beurres et matières grasses, etc.</a:t>
+                        <a:rPr lang="fr-FR" sz="1900" dirty="0"/>
+                        <a:t>Produits laitiers frais, œufs, frites, coca, hamburger, pizza, encore des </a:t>
+                      </a:r>
+                      <a:r>
+                        <a:rPr lang="fr-FR" sz="1900" dirty="0" err="1"/>
+                        <a:t>frites,la</a:t>
+                      </a:r>
+                      <a:r>
+                        <a:rPr lang="fr-FR" sz="1900" dirty="0"/>
+                        <a:t> sauce desserts lactés, beurres et matières grasses, etc.</a:t>
                       </a:r>
                     </a:p>
                   </a:txBody>
@@ -10839,7 +11099,7 @@
                     <a:lstStyle/>
                     <a:p>
                       <a:r>
-                        <a:rPr lang="fr-FR" sz="1900"/>
+                        <a:rPr lang="fr-FR" sz="1900" dirty="0"/>
                         <a:t>- 18° C </a:t>
                       </a:r>
                     </a:p>

</xml_diff>